<commit_message>
Updated multimedia support file
</commit_message>
<xml_diff>
--- a/Introduction.pptx
+++ b/Introduction.pptx
@@ -219,7 +219,7 @@
           <a:p>
             <a:fld id="{9D46689B-8FBB-4C06-A74A-ED2FBE7CBE61}" type="datetimeFigureOut">
               <a:rPr lang="en-US" smtClean="0"/>
-              <a:t>10/21/2020</a:t>
+              <a:t>10/25/2020</a:t>
             </a:fld>
             <a:endParaRPr lang="en-US"/>
           </a:p>
@@ -2719,7 +2719,7 @@
           <a:p>
             <a:fld id="{C5C6E621-F223-41F5-8420-74EB8708A5A2}" type="datetimeFigureOut">
               <a:rPr lang="en-US" smtClean="0"/>
-              <a:t>10/21/2020</a:t>
+              <a:t>10/25/2020</a:t>
             </a:fld>
             <a:endParaRPr lang="en-US"/>
           </a:p>
@@ -2981,7 +2981,7 @@
           <a:p>
             <a:fld id="{C5C6E621-F223-41F5-8420-74EB8708A5A2}" type="datetimeFigureOut">
               <a:rPr lang="en-US" smtClean="0"/>
-              <a:t>10/21/2020</a:t>
+              <a:t>10/25/2020</a:t>
             </a:fld>
             <a:endParaRPr lang="en-US"/>
           </a:p>
@@ -3216,7 +3216,7 @@
           <a:p>
             <a:fld id="{C5C6E621-F223-41F5-8420-74EB8708A5A2}" type="datetimeFigureOut">
               <a:rPr lang="en-US" smtClean="0"/>
-              <a:t>10/21/2020</a:t>
+              <a:t>10/25/2020</a:t>
             </a:fld>
             <a:endParaRPr lang="en-US"/>
           </a:p>
@@ -3456,7 +3456,7 @@
           <a:p>
             <a:fld id="{C5C6E621-F223-41F5-8420-74EB8708A5A2}" type="datetimeFigureOut">
               <a:rPr lang="en-US" smtClean="0"/>
-              <a:t>10/21/2020</a:t>
+              <a:t>10/25/2020</a:t>
             </a:fld>
             <a:endParaRPr lang="en-US"/>
           </a:p>
@@ -3763,7 +3763,7 @@
           <a:p>
             <a:fld id="{C5C6E621-F223-41F5-8420-74EB8708A5A2}" type="datetimeFigureOut">
               <a:rPr lang="en-US" smtClean="0"/>
-              <a:t>10/21/2020</a:t>
+              <a:t>10/25/2020</a:t>
             </a:fld>
             <a:endParaRPr lang="en-US"/>
           </a:p>
@@ -4065,7 +4065,7 @@
           <a:p>
             <a:fld id="{C5C6E621-F223-41F5-8420-74EB8708A5A2}" type="datetimeFigureOut">
               <a:rPr lang="en-US" smtClean="0"/>
-              <a:t>10/21/2020</a:t>
+              <a:t>10/25/2020</a:t>
             </a:fld>
             <a:endParaRPr lang="en-US"/>
           </a:p>
@@ -4487,7 +4487,7 @@
           <a:p>
             <a:fld id="{C5C6E621-F223-41F5-8420-74EB8708A5A2}" type="datetimeFigureOut">
               <a:rPr lang="en-US" smtClean="0"/>
-              <a:t>10/21/2020</a:t>
+              <a:t>10/25/2020</a:t>
             </a:fld>
             <a:endParaRPr lang="en-US"/>
           </a:p>
@@ -4649,7 +4649,7 @@
           <a:p>
             <a:fld id="{C5C6E621-F223-41F5-8420-74EB8708A5A2}" type="datetimeFigureOut">
               <a:rPr lang="en-US" smtClean="0"/>
-              <a:t>10/21/2020</a:t>
+              <a:t>10/25/2020</a:t>
             </a:fld>
             <a:endParaRPr lang="en-US"/>
           </a:p>
@@ -4744,7 +4744,7 @@
           <a:p>
             <a:fld id="{C5C6E621-F223-41F5-8420-74EB8708A5A2}" type="datetimeFigureOut">
               <a:rPr lang="en-US" smtClean="0"/>
-              <a:t>10/21/2020</a:t>
+              <a:t>10/25/2020</a:t>
             </a:fld>
             <a:endParaRPr lang="en-US"/>
           </a:p>
@@ -5122,7 +5122,7 @@
           <a:p>
             <a:fld id="{C5C6E621-F223-41F5-8420-74EB8708A5A2}" type="datetimeFigureOut">
               <a:rPr lang="en-US" smtClean="0"/>
-              <a:t>10/21/2020</a:t>
+              <a:t>10/25/2020</a:t>
             </a:fld>
             <a:endParaRPr lang="en-US"/>
           </a:p>
@@ -5411,7 +5411,7 @@
           <a:p>
             <a:fld id="{C5C6E621-F223-41F5-8420-74EB8708A5A2}" type="datetimeFigureOut">
               <a:rPr lang="en-US" smtClean="0"/>
-              <a:t>10/21/2020</a:t>
+              <a:t>10/25/2020</a:t>
             </a:fld>
             <a:endParaRPr lang="en-US"/>
           </a:p>
@@ -5622,7 +5622,7 @@
           <a:p>
             <a:fld id="{C5C6E621-F223-41F5-8420-74EB8708A5A2}" type="datetimeFigureOut">
               <a:rPr lang="en-US" smtClean="0"/>
-              <a:t>10/21/2020</a:t>
+              <a:t>10/25/2020</a:t>
             </a:fld>
             <a:endParaRPr lang="en-US"/>
           </a:p>
@@ -12286,7 +12286,7 @@
           <a:p>
             <a:r>
               <a:rPr lang="en-US" dirty="0"/>
-              <a:t>Introduction</a:t>
+              <a:t>Features</a:t>
             </a:r>
           </a:p>
         </p:txBody>

</xml_diff>